<commit_message>
edit microquiz9w/9f, soln for CP_sum_bound_by_integral
</commit_message>
<xml_diff>
--- a/spring13/slides13/microquiz9f-afternoon.pptx
+++ b/spring13/slides13/microquiz9f-afternoon.pptx
@@ -632,7 +632,7 @@
         <p:spPr bwMode="auto">
           <a:xfrm>
             <a:off x="4125913" y="6611938"/>
-            <a:ext cx="991941" cy="261610"/>
+            <a:ext cx="1049674" cy="261610"/>
           </a:xfrm>
           <a:prstGeom prst="rect">
             <a:avLst/>
@@ -665,7 +665,13 @@
               <a:rPr lang="en-US" sz="1000" baseline="0" dirty="0" smtClean="0">
                 <a:latin typeface="Comic Sans MS" pitchFamily="66" charset="0"/>
               </a:rPr>
-              <a:t> 8</a:t>
+              <a:t> </a:t>
+            </a:r>
+            <a:r>
+              <a:rPr lang="en-US" sz="1000" baseline="0" dirty="0" smtClean="0">
+                <a:latin typeface="Comic Sans MS" pitchFamily="66" charset="0"/>
+              </a:rPr>
+              <a:t>12</a:t>
             </a:r>
             <a:r>
               <a:rPr lang="en-US" sz="1000" dirty="0" smtClean="0">
@@ -1164,7 +1170,7 @@
         <p:spPr>
           <a:xfrm>
             <a:off x="1628325" y="388045"/>
-            <a:ext cx="6072095" cy="584776"/>
+            <a:ext cx="5751895" cy="584776"/>
           </a:xfrm>
           <a:prstGeom prst="rect">
             <a:avLst/>
@@ -1185,32 +1191,11 @@
               <a:t>6.042 </a:t>
             </a:r>
             <a:r>
-              <a:rPr lang="en-US" sz="3200" dirty="0" err="1" smtClean="0">
-                <a:latin typeface="Comic Sans MS"/>
-                <a:cs typeface="Comic Sans MS"/>
-              </a:rPr>
-              <a:t>Microquiz</a:t>
-            </a:r>
-            <a:r>
               <a:rPr lang="en-US" sz="3200" dirty="0" smtClean="0">
                 <a:latin typeface="Comic Sans MS"/>
                 <a:cs typeface="Comic Sans MS"/>
               </a:rPr>
-              <a:t> </a:t>
-            </a:r>
-            <a:r>
-              <a:rPr lang="en-US" sz="3200" smtClean="0">
-                <a:latin typeface="Comic Sans MS"/>
-                <a:cs typeface="Comic Sans MS"/>
-              </a:rPr>
-              <a:t>April 12, </a:t>
-            </a:r>
-            <a:r>
-              <a:rPr lang="en-US" sz="3200" dirty="0" smtClean="0">
-                <a:latin typeface="Comic Sans MS"/>
-                <a:cs typeface="Comic Sans MS"/>
-              </a:rPr>
-              <a:t>2013</a:t>
+              <a:t>Microquiz9f afternoon</a:t>
             </a:r>
             <a:endParaRPr lang="en-US" sz="3200" dirty="0">
               <a:latin typeface="Comic Sans MS"/>
@@ -1219,166 +1204,555 @@
           </a:p>
         </p:txBody>
       </p:sp>
-      <p:sp>
-        <p:nvSpPr>
-          <p:cNvPr id="2" name="Rectangle 1"/>
-          <p:cNvSpPr/>
-          <p:nvPr/>
-        </p:nvSpPr>
-        <p:spPr>
-          <a:xfrm>
-            <a:off x="134176" y="1590428"/>
-            <a:ext cx="8640861" cy="2185214"/>
-          </a:xfrm>
-          <a:prstGeom prst="rect">
-            <a:avLst/>
-          </a:prstGeom>
-        </p:spPr>
-        <p:txBody>
-          <a:bodyPr wrap="square">
-            <a:spAutoFit/>
-          </a:bodyPr>
-          <a:lstStyle/>
-          <a:p>
-            <a:r>
-              <a:rPr lang="en-US" sz="3400" dirty="0"/>
-              <a:t>State the strongest asymptotic relation (O(), o(), ~,    ) between the following 2 pairs of relations (f =o(g) is stronger than f=O(g), and </a:t>
-            </a:r>
-            <a:r>
-              <a:rPr lang="en-US" sz="3400" dirty="0" err="1"/>
-              <a:t>f~g</a:t>
-            </a:r>
-            <a:r>
-              <a:rPr lang="en-US" sz="3400" dirty="0"/>
-              <a:t> is stronger than f =    (g)):</a:t>
-            </a:r>
-          </a:p>
-        </p:txBody>
-      </p:sp>
       <p:graphicFrame>
         <p:nvGraphicFramePr>
-          <p:cNvPr id="9" name="Object 8"/>
+          <p:cNvPr id="2" name="Table 1"/>
           <p:cNvGraphicFramePr>
-            <a:graphicFrameLocks noChangeAspect="1"/>
+            <a:graphicFrameLocks noGrp="1"/>
           </p:cNvGraphicFramePr>
           <p:nvPr>
             <p:extLst>
               <p:ext uri="{D42A27DB-BD31-4B8C-83A1-F6EECF244321}">
-                <p14:modId xmlns:p14="http://schemas.microsoft.com/office/powerpoint/2010/main" val="4203959762"/>
+                <p14:modId xmlns:p14="http://schemas.microsoft.com/office/powerpoint/2010/main" val="3322524287"/>
               </p:ext>
             </p:extLst>
           </p:nvPr>
         </p:nvGraphicFramePr>
         <p:xfrm>
-          <a:off x="601605" y="2152056"/>
-          <a:ext cx="445655" cy="519931"/>
+          <a:off x="928306" y="2992799"/>
+          <a:ext cx="6951909" cy="3033839"/>
         </p:xfrm>
         <a:graphic>
-          <a:graphicData uri="http://schemas.openxmlformats.org/presentationml/2006/ole">
-            <mc:AlternateContent xmlns:mc="http://schemas.openxmlformats.org/markup-compatibility/2006">
-              <mc:Choice xmlns:v="urn:schemas-microsoft-com:vml" Requires="v">
-                <p:oleObj spid="_x0000_s1025" name="Equation" r:id="rId3" imgW="152400" imgH="177800" progId="Equation.3">
-                  <p:embed/>
-                </p:oleObj>
-              </mc:Choice>
-              <mc:Fallback>
-                <p:oleObj name="Equation" r:id="rId3" imgW="152400" imgH="177800" progId="Equation.3">
-                  <p:embed/>
-                  <p:pic>
-                    <p:nvPicPr>
-                      <p:cNvPr id="0" name=""/>
-                      <p:cNvPicPr/>
-                      <p:nvPr/>
-                    </p:nvPicPr>
-                    <p:blipFill>
-                      <a:blip r:embed="rId4"/>
-                      <a:stretch>
-                        <a:fillRect/>
-                      </a:stretch>
-                    </p:blipFill>
-                    <p:spPr>
-                      <a:xfrm>
-                        <a:off x="601605" y="2152056"/>
-                        <a:ext cx="445655" cy="519931"/>
-                      </a:xfrm>
-                      <a:prstGeom prst="rect">
-                        <a:avLst/>
-                      </a:prstGeom>
-                    </p:spPr>
-                  </p:pic>
-                </p:oleObj>
-              </mc:Fallback>
-            </mc:AlternateContent>
-          </a:graphicData>
-        </a:graphic>
-      </p:graphicFrame>
-      <p:graphicFrame>
-        <p:nvGraphicFramePr>
-          <p:cNvPr id="10" name="Object 9"/>
-          <p:cNvGraphicFramePr>
-            <a:graphicFrameLocks noChangeAspect="1"/>
-          </p:cNvGraphicFramePr>
-          <p:nvPr>
-            <p:extLst>
-              <p:ext uri="{D42A27DB-BD31-4B8C-83A1-F6EECF244321}">
-                <p14:modId xmlns:p14="http://schemas.microsoft.com/office/powerpoint/2010/main" val="2757568063"/>
-              </p:ext>
-            </p:extLst>
-          </p:nvPr>
-        </p:nvGraphicFramePr>
-        <p:xfrm>
-          <a:off x="3110794" y="3255711"/>
-          <a:ext cx="445655" cy="519931"/>
-        </p:xfrm>
-        <a:graphic>
-          <a:graphicData uri="http://schemas.openxmlformats.org/presentationml/2006/ole">
-            <mc:AlternateContent xmlns:mc="http://schemas.openxmlformats.org/markup-compatibility/2006">
-              <mc:Choice xmlns:v="urn:schemas-microsoft-com:vml" Requires="v">
-                <p:oleObj spid="_x0000_s1026" name="Equation" r:id="rId5" imgW="152400" imgH="177800" progId="Equation.3">
-                  <p:embed/>
-                </p:oleObj>
-              </mc:Choice>
-              <mc:Fallback>
-                <p:oleObj name="Equation" r:id="rId5" imgW="152400" imgH="177800" progId="Equation.3">
-                  <p:embed/>
-                  <p:pic>
-                    <p:nvPicPr>
-                      <p:cNvPr id="0" name=""/>
-                      <p:cNvPicPr/>
-                      <p:nvPr/>
-                    </p:nvPicPr>
-                    <p:blipFill>
-                      <a:blip r:embed="rId4"/>
-                      <a:stretch>
-                        <a:fillRect/>
-                      </a:stretch>
-                    </p:blipFill>
-                    <p:spPr>
-                      <a:xfrm>
-                        <a:off x="3110794" y="3255711"/>
-                        <a:ext cx="445655" cy="519931"/>
-                      </a:xfrm>
-                      <a:prstGeom prst="rect">
-                        <a:avLst/>
-                      </a:prstGeom>
-                    </p:spPr>
-                  </p:pic>
-                </p:oleObj>
-              </mc:Fallback>
-            </mc:AlternateContent>
+          <a:graphicData uri="http://schemas.openxmlformats.org/drawingml/2006/table">
+            <a:tbl>
+              <a:tblPr firstRow="1" bandRow="1">
+                <a:tableStyleId>{5940675A-B579-460E-94D1-54222C63F5DA}</a:tableStyleId>
+              </a:tblPr>
+              <a:tblGrid>
+                <a:gridCol w="1931772"/>
+                <a:gridCol w="2090057"/>
+                <a:gridCol w="2930080"/>
+              </a:tblGrid>
+              <a:tr h="471959">
+                <a:tc>
+                  <a:txBody>
+                    <a:bodyPr/>
+                    <a:lstStyle/>
+                    <a:p>
+                      <a:pPr algn="ctr"/>
+                      <a:r>
+                        <a:rPr lang="en-US" sz="2800" dirty="0" smtClean="0">
+                          <a:latin typeface="Comic Sans MS"/>
+                          <a:cs typeface="Comic Sans MS"/>
+                        </a:rPr>
+                        <a:t>f(n)</a:t>
+                      </a:r>
+                      <a:endParaRPr lang="en-US" sz="2800" dirty="0">
+                        <a:latin typeface="Comic Sans MS"/>
+                        <a:cs typeface="Comic Sans MS"/>
+                      </a:endParaRPr>
+                    </a:p>
+                  </a:txBody>
+                  <a:tcPr anchor="ctr"/>
+                </a:tc>
+                <a:tc>
+                  <a:txBody>
+                    <a:bodyPr/>
+                    <a:lstStyle/>
+                    <a:p>
+                      <a:pPr algn="ctr"/>
+                      <a:r>
+                        <a:rPr lang="en-US" sz="2800" dirty="0" smtClean="0">
+                          <a:latin typeface="Comic Sans MS"/>
+                          <a:cs typeface="Comic Sans MS"/>
+                        </a:rPr>
+                        <a:t>g(n)</a:t>
+                      </a:r>
+                      <a:endParaRPr lang="en-US" sz="2800" dirty="0">
+                        <a:latin typeface="Comic Sans MS"/>
+                        <a:cs typeface="Comic Sans MS"/>
+                      </a:endParaRPr>
+                    </a:p>
+                  </a:txBody>
+                  <a:tcPr anchor="ctr"/>
+                </a:tc>
+                <a:tc>
+                  <a:txBody>
+                    <a:bodyPr/>
+                    <a:lstStyle/>
+                    <a:p>
+                      <a:pPr algn="ctr"/>
+                      <a:r>
+                        <a:rPr lang="en-US" sz="2800" dirty="0" smtClean="0">
+                          <a:latin typeface="Comic Sans MS"/>
+                          <a:cs typeface="Comic Sans MS"/>
+                        </a:rPr>
+                        <a:t>~, o,</a:t>
+                      </a:r>
+                      <a:r>
+                        <a:rPr lang="en-US" sz="2800" baseline="0" dirty="0" smtClean="0">
+                          <a:latin typeface="Comic Sans MS"/>
+                          <a:cs typeface="Comic Sans MS"/>
+                        </a:rPr>
+                        <a:t> O, Theta</a:t>
+                      </a:r>
+                      <a:endParaRPr lang="en-US" sz="2800" dirty="0">
+                        <a:latin typeface="Comic Sans MS"/>
+                        <a:cs typeface="Comic Sans MS"/>
+                      </a:endParaRPr>
+                    </a:p>
+                  </a:txBody>
+                  <a:tcPr anchor="ctr"/>
+                </a:tc>
+              </a:tr>
+              <a:tr h="628920">
+                <a:tc>
+                  <a:txBody>
+                    <a:bodyPr/>
+                    <a:lstStyle/>
+                    <a:p>
+                      <a:pPr algn="ctr"/>
+                      <a:r>
+                        <a:rPr lang="en-US" sz="2800" dirty="0" smtClean="0">
+                          <a:latin typeface="Comic Sans MS"/>
+                          <a:cs typeface="Comic Sans MS"/>
+                        </a:rPr>
+                        <a:t>n</a:t>
+                      </a:r>
+                      <a:r>
+                        <a:rPr lang="en-US" sz="2800" baseline="30000" dirty="0" smtClean="0">
+                          <a:latin typeface="Comic Sans MS"/>
+                          <a:cs typeface="Comic Sans MS"/>
+                        </a:rPr>
+                        <a:t>3/2</a:t>
+                      </a:r>
+                      <a:endParaRPr lang="en-US" sz="2800" dirty="0">
+                        <a:latin typeface="Comic Sans MS"/>
+                        <a:cs typeface="Comic Sans MS"/>
+                      </a:endParaRPr>
+                    </a:p>
+                  </a:txBody>
+                  <a:tcPr anchor="ctr"/>
+                </a:tc>
+                <a:tc>
+                  <a:txBody>
+                    <a:bodyPr/>
+                    <a:lstStyle/>
+                    <a:p>
+                      <a:pPr marL="0" marR="0" lvl="0" indent="0" algn="ctr" defTabSz="914400" rtl="0" eaLnBrk="1" fontAlgn="auto" latinLnBrk="0" hangingPunct="1">
+                        <a:lnSpc>
+                          <a:spcPct val="100000"/>
+                        </a:lnSpc>
+                        <a:spcBef>
+                          <a:spcPts val="0"/>
+                        </a:spcBef>
+                        <a:spcAft>
+                          <a:spcPts val="0"/>
+                        </a:spcAft>
+                        <a:buClrTx/>
+                        <a:buSzTx/>
+                        <a:buFontTx/>
+                        <a:buNone/>
+                        <a:tabLst/>
+                        <a:defRPr/>
+                      </a:pPr>
+                      <a:r>
+                        <a:rPr kumimoji="0" lang="en-US" sz="2800" u="none" strike="noStrike" kern="1200" cap="none" spc="0" normalizeH="0" baseline="0" noProof="0" dirty="0" smtClean="0">
+                          <a:ln>
+                            <a:noFill/>
+                          </a:ln>
+                          <a:effectLst/>
+                          <a:uLnTx/>
+                          <a:uFillTx/>
+                          <a:latin typeface="Comic Sans MS"/>
+                          <a:cs typeface="Comic Sans MS"/>
+                        </a:rPr>
+                        <a:t>(n+1)</a:t>
+                      </a:r>
+                      <a:r>
+                        <a:rPr kumimoji="0" lang="en-US" sz="2800" u="none" strike="noStrike" kern="1200" cap="none" spc="0" normalizeH="0" baseline="30000" noProof="0" dirty="0" smtClean="0">
+                          <a:ln>
+                            <a:noFill/>
+                          </a:ln>
+                          <a:effectLst/>
+                          <a:uLnTx/>
+                          <a:uFillTx/>
+                          <a:latin typeface="Comic Sans MS"/>
+                          <a:cs typeface="Comic Sans MS"/>
+                        </a:rPr>
+                        <a:t>3/2</a:t>
+                      </a:r>
+                      <a:endParaRPr kumimoji="0" lang="en-US" sz="2800" b="0" i="0" u="none" strike="noStrike" kern="1200" cap="none" spc="0" normalizeH="0" baseline="0" noProof="0" dirty="0" smtClean="0">
+                        <a:ln>
+                          <a:noFill/>
+                        </a:ln>
+                        <a:solidFill>
+                          <a:srgbClr val="000000"/>
+                        </a:solidFill>
+                        <a:effectLst/>
+                        <a:uLnTx/>
+                        <a:uFillTx/>
+                        <a:latin typeface="Comic Sans MS"/>
+                        <a:ea typeface="+mn-ea"/>
+                        <a:cs typeface="Comic Sans MS"/>
+                      </a:endParaRPr>
+                    </a:p>
+                  </a:txBody>
+                  <a:tcPr anchor="ctr"/>
+                </a:tc>
+                <a:tc>
+                  <a:txBody>
+                    <a:bodyPr/>
+                    <a:lstStyle/>
+                    <a:p>
+                      <a:pPr algn="ctr"/>
+                      <a:endParaRPr lang="en-US" sz="2800" dirty="0">
+                        <a:latin typeface="Comic Sans MS"/>
+                        <a:cs typeface="Comic Sans MS"/>
+                      </a:endParaRPr>
+                    </a:p>
+                  </a:txBody>
+                  <a:tcPr anchor="ctr"/>
+                </a:tc>
+              </a:tr>
+              <a:tr h="628920">
+                <a:tc>
+                  <a:txBody>
+                    <a:bodyPr/>
+                    <a:lstStyle/>
+                    <a:p>
+                      <a:pPr marL="0" marR="0" lvl="0" indent="0" algn="ctr" defTabSz="914400" rtl="0" eaLnBrk="1" fontAlgn="auto" latinLnBrk="0" hangingPunct="1">
+                        <a:lnSpc>
+                          <a:spcPct val="100000"/>
+                        </a:lnSpc>
+                        <a:spcBef>
+                          <a:spcPts val="0"/>
+                        </a:spcBef>
+                        <a:spcAft>
+                          <a:spcPts val="0"/>
+                        </a:spcAft>
+                        <a:buClrTx/>
+                        <a:buSzTx/>
+                        <a:buFontTx/>
+                        <a:buNone/>
+                        <a:tabLst/>
+                        <a:defRPr/>
+                      </a:pPr>
+                      <a:r>
+                        <a:rPr kumimoji="0" lang="en-US" sz="2800" u="none" strike="noStrike" kern="1200" cap="none" spc="0" normalizeH="0" baseline="0" noProof="0" dirty="0" smtClean="0">
+                          <a:ln>
+                            <a:noFill/>
+                          </a:ln>
+                          <a:effectLst/>
+                          <a:uLnTx/>
+                          <a:uFillTx/>
+                          <a:latin typeface="Comic Sans MS"/>
+                          <a:cs typeface="Comic Sans MS"/>
+                        </a:rPr>
+                        <a:t>(2n)</a:t>
+                      </a:r>
+                      <a:r>
+                        <a:rPr kumimoji="0" lang="en-US" sz="2800" u="none" strike="noStrike" kern="1200" cap="none" spc="0" normalizeH="0" baseline="30000" noProof="0" dirty="0" smtClean="0">
+                          <a:ln>
+                            <a:noFill/>
+                          </a:ln>
+                          <a:effectLst/>
+                          <a:uLnTx/>
+                          <a:uFillTx/>
+                          <a:latin typeface="Comic Sans MS"/>
+                          <a:cs typeface="Comic Sans MS"/>
+                        </a:rPr>
+                        <a:t>3/2</a:t>
+                      </a:r>
+                      <a:endParaRPr kumimoji="0" lang="en-US" sz="2800" b="0" i="0" u="none" strike="noStrike" kern="1200" cap="none" spc="0" normalizeH="0" baseline="0" noProof="0" dirty="0" smtClean="0">
+                        <a:ln>
+                          <a:noFill/>
+                        </a:ln>
+                        <a:solidFill>
+                          <a:srgbClr val="000000"/>
+                        </a:solidFill>
+                        <a:effectLst/>
+                        <a:uLnTx/>
+                        <a:uFillTx/>
+                        <a:latin typeface="Comic Sans MS"/>
+                        <a:ea typeface="+mn-ea"/>
+                        <a:cs typeface="Comic Sans MS"/>
+                      </a:endParaRPr>
+                    </a:p>
+                  </a:txBody>
+                  <a:tcPr anchor="ctr"/>
+                </a:tc>
+                <a:tc>
+                  <a:txBody>
+                    <a:bodyPr/>
+                    <a:lstStyle/>
+                    <a:p>
+                      <a:pPr marL="0" marR="0" lvl="0" indent="0" algn="ctr" defTabSz="914400" rtl="0" eaLnBrk="1" fontAlgn="auto" latinLnBrk="0" hangingPunct="1">
+                        <a:lnSpc>
+                          <a:spcPct val="100000"/>
+                        </a:lnSpc>
+                        <a:spcBef>
+                          <a:spcPts val="0"/>
+                        </a:spcBef>
+                        <a:spcAft>
+                          <a:spcPts val="0"/>
+                        </a:spcAft>
+                        <a:buClrTx/>
+                        <a:buSzTx/>
+                        <a:buFontTx/>
+                        <a:buNone/>
+                        <a:tabLst/>
+                        <a:defRPr/>
+                      </a:pPr>
+                      <a:r>
+                        <a:rPr kumimoji="0" lang="en-US" sz="2800" u="none" strike="noStrike" kern="1200" cap="none" spc="0" normalizeH="0" baseline="0" noProof="0" dirty="0" smtClean="0">
+                          <a:ln>
+                            <a:noFill/>
+                          </a:ln>
+                          <a:effectLst/>
+                          <a:uLnTx/>
+                          <a:uFillTx/>
+                          <a:latin typeface="Comic Sans MS"/>
+                          <a:cs typeface="Comic Sans MS"/>
+                        </a:rPr>
+                        <a:t>n</a:t>
+                      </a:r>
+                      <a:r>
+                        <a:rPr kumimoji="0" lang="en-US" sz="2800" u="none" strike="noStrike" kern="1200" cap="none" spc="0" normalizeH="0" baseline="30000" noProof="0" dirty="0" smtClean="0">
+                          <a:ln>
+                            <a:noFill/>
+                          </a:ln>
+                          <a:effectLst/>
+                          <a:uLnTx/>
+                          <a:uFillTx/>
+                          <a:latin typeface="Comic Sans MS"/>
+                          <a:cs typeface="Comic Sans MS"/>
+                        </a:rPr>
+                        <a:t>3/2</a:t>
+                      </a:r>
+                      <a:endParaRPr kumimoji="0" lang="en-US" sz="2800" b="0" i="0" u="none" strike="noStrike" kern="1200" cap="none" spc="0" normalizeH="0" baseline="30000" noProof="0" dirty="0" smtClean="0">
+                        <a:ln>
+                          <a:noFill/>
+                        </a:ln>
+                        <a:solidFill>
+                          <a:srgbClr val="000000"/>
+                        </a:solidFill>
+                        <a:effectLst/>
+                        <a:uLnTx/>
+                        <a:uFillTx/>
+                        <a:latin typeface="Comic Sans MS"/>
+                        <a:ea typeface="+mn-ea"/>
+                        <a:cs typeface="Comic Sans MS"/>
+                      </a:endParaRPr>
+                    </a:p>
+                  </a:txBody>
+                  <a:tcPr anchor="ctr"/>
+                </a:tc>
+                <a:tc>
+                  <a:txBody>
+                    <a:bodyPr/>
+                    <a:lstStyle/>
+                    <a:p>
+                      <a:pPr algn="ctr"/>
+                      <a:endParaRPr lang="en-US" sz="2800" dirty="0">
+                        <a:latin typeface="Comic Sans MS"/>
+                        <a:cs typeface="Comic Sans MS"/>
+                      </a:endParaRPr>
+                    </a:p>
+                  </a:txBody>
+                  <a:tcPr anchor="ctr"/>
+                </a:tc>
+              </a:tr>
+              <a:tr h="628920">
+                <a:tc>
+                  <a:txBody>
+                    <a:bodyPr/>
+                    <a:lstStyle/>
+                    <a:p>
+                      <a:pPr algn="ctr"/>
+                      <a:r>
+                        <a:rPr lang="en-US" sz="2800" dirty="0" smtClean="0">
+                          <a:latin typeface="Comic Sans MS"/>
+                          <a:cs typeface="Comic Sans MS"/>
+                        </a:rPr>
+                        <a:t>2</a:t>
+                      </a:r>
+                      <a:r>
+                        <a:rPr lang="en-US" sz="2800" baseline="30000" dirty="0" smtClean="0">
+                          <a:latin typeface="Comic Sans MS"/>
+                          <a:cs typeface="Comic Sans MS"/>
+                        </a:rPr>
+                        <a:t>n+1</a:t>
+                      </a:r>
+                      <a:endParaRPr lang="en-US" sz="2800" dirty="0">
+                        <a:latin typeface="Comic Sans MS"/>
+                        <a:cs typeface="Comic Sans MS"/>
+                      </a:endParaRPr>
+                    </a:p>
+                  </a:txBody>
+                  <a:tcPr anchor="ctr"/>
+                </a:tc>
+                <a:tc>
+                  <a:txBody>
+                    <a:bodyPr/>
+                    <a:lstStyle/>
+                    <a:p>
+                      <a:pPr algn="ctr"/>
+                      <a:r>
+                        <a:rPr lang="en-US" sz="2800" dirty="0" smtClean="0">
+                          <a:latin typeface="Comic Sans MS"/>
+                          <a:cs typeface="Comic Sans MS"/>
+                        </a:rPr>
+                        <a:t>2</a:t>
+                      </a:r>
+                      <a:r>
+                        <a:rPr lang="en-US" sz="2800" baseline="30000" dirty="0" smtClean="0">
+                          <a:latin typeface="Comic Sans MS"/>
+                          <a:cs typeface="Comic Sans MS"/>
+                        </a:rPr>
+                        <a:t>n</a:t>
+                      </a:r>
+                      <a:endParaRPr lang="en-US" sz="2800" baseline="30000" dirty="0">
+                        <a:latin typeface="Comic Sans MS"/>
+                        <a:cs typeface="Comic Sans MS"/>
+                      </a:endParaRPr>
+                    </a:p>
+                  </a:txBody>
+                  <a:tcPr anchor="ctr"/>
+                </a:tc>
+                <a:tc>
+                  <a:txBody>
+                    <a:bodyPr/>
+                    <a:lstStyle/>
+                    <a:p>
+                      <a:pPr algn="ctr"/>
+                      <a:endParaRPr lang="en-US" sz="2800" dirty="0">
+                        <a:latin typeface="Comic Sans MS"/>
+                        <a:cs typeface="Comic Sans MS"/>
+                      </a:endParaRPr>
+                    </a:p>
+                  </a:txBody>
+                  <a:tcPr anchor="ctr"/>
+                </a:tc>
+              </a:tr>
+              <a:tr h="628920">
+                <a:tc>
+                  <a:txBody>
+                    <a:bodyPr/>
+                    <a:lstStyle/>
+                    <a:p>
+                      <a:pPr marL="0" marR="0" indent="0" algn="ctr" defTabSz="914400" rtl="0" eaLnBrk="1" fontAlgn="auto" latinLnBrk="0" hangingPunct="1">
+                        <a:lnSpc>
+                          <a:spcPct val="100000"/>
+                        </a:lnSpc>
+                        <a:spcBef>
+                          <a:spcPts val="0"/>
+                        </a:spcBef>
+                        <a:spcAft>
+                          <a:spcPts val="0"/>
+                        </a:spcAft>
+                        <a:buClrTx/>
+                        <a:buSzTx/>
+                        <a:buFontTx/>
+                        <a:buNone/>
+                        <a:tabLst/>
+                        <a:defRPr/>
+                      </a:pPr>
+                      <a:r>
+                        <a:rPr lang="en-US" sz="2800" dirty="0" smtClean="0">
+                          <a:latin typeface="Comic Sans MS"/>
+                          <a:cs typeface="Comic Sans MS"/>
+                        </a:rPr>
+                        <a:t>2</a:t>
+                      </a:r>
+                      <a:r>
+                        <a:rPr lang="en-US" sz="2800" baseline="30000" dirty="0" smtClean="0">
+                          <a:latin typeface="Comic Sans MS"/>
+                          <a:cs typeface="Comic Sans MS"/>
+                        </a:rPr>
+                        <a:t>n</a:t>
+                      </a:r>
+                      <a:endParaRPr lang="en-US" sz="2800" dirty="0" smtClean="0">
+                        <a:latin typeface="Comic Sans MS"/>
+                        <a:cs typeface="Comic Sans MS"/>
+                      </a:endParaRPr>
+                    </a:p>
+                  </a:txBody>
+                  <a:tcPr anchor="ctr"/>
+                </a:tc>
+                <a:tc>
+                  <a:txBody>
+                    <a:bodyPr/>
+                    <a:lstStyle/>
+                    <a:p>
+                      <a:pPr marL="0" marR="0" indent="0" algn="ctr" defTabSz="914400" rtl="0" eaLnBrk="1" fontAlgn="auto" latinLnBrk="0" hangingPunct="1">
+                        <a:lnSpc>
+                          <a:spcPct val="100000"/>
+                        </a:lnSpc>
+                        <a:spcBef>
+                          <a:spcPts val="0"/>
+                        </a:spcBef>
+                        <a:spcAft>
+                          <a:spcPts val="0"/>
+                        </a:spcAft>
+                        <a:buClrTx/>
+                        <a:buSzTx/>
+                        <a:buFontTx/>
+                        <a:buNone/>
+                        <a:tabLst/>
+                        <a:defRPr/>
+                      </a:pPr>
+                      <a:r>
+                        <a:rPr lang="en-US" sz="2800" dirty="0" smtClean="0">
+                          <a:latin typeface="Comic Sans MS"/>
+                          <a:cs typeface="Comic Sans MS"/>
+                        </a:rPr>
+                        <a:t>2</a:t>
+                      </a:r>
+                      <a:r>
+                        <a:rPr lang="en-US" sz="2800" baseline="30000" dirty="0" smtClean="0">
+                          <a:latin typeface="Comic Sans MS"/>
+                          <a:cs typeface="Comic Sans MS"/>
+                        </a:rPr>
+                        <a:t>2n</a:t>
+                      </a:r>
+                      <a:endParaRPr lang="en-US" sz="2800" dirty="0" smtClean="0">
+                        <a:latin typeface="Comic Sans MS"/>
+                        <a:cs typeface="Comic Sans MS"/>
+                      </a:endParaRPr>
+                    </a:p>
+                  </a:txBody>
+                  <a:tcPr anchor="ctr"/>
+                </a:tc>
+                <a:tc>
+                  <a:txBody>
+                    <a:bodyPr/>
+                    <a:lstStyle/>
+                    <a:p>
+                      <a:pPr algn="ctr"/>
+                      <a:endParaRPr lang="en-US" sz="2800" dirty="0">
+                        <a:latin typeface="Comic Sans MS"/>
+                        <a:cs typeface="Comic Sans MS"/>
+                      </a:endParaRPr>
+                    </a:p>
+                  </a:txBody>
+                  <a:tcPr anchor="ctr"/>
+                </a:tc>
+              </a:tr>
+            </a:tbl>
           </a:graphicData>
         </a:graphic>
       </p:graphicFrame>
       <p:sp>
         <p:nvSpPr>
-          <p:cNvPr id="16" name="TextBox 15"/>
+          <p:cNvPr id="3" name="TextBox 2"/>
           <p:cNvSpPr txBox="1"/>
           <p:nvPr/>
         </p:nvSpPr>
         <p:spPr>
           <a:xfrm>
-            <a:off x="211173" y="4004657"/>
-            <a:ext cx="687207" cy="830997"/>
+            <a:off x="374777" y="1517743"/>
+            <a:ext cx="8394445" cy="1077218"/>
           </a:xfrm>
           <a:prstGeom prst="rect">
             <a:avLst/>
@@ -1392,339 +1766,25 @@
           <a:lstStyle/>
           <a:p>
             <a:r>
-              <a:rPr lang="en-US" sz="4800" dirty="0" smtClean="0">
+              <a:rPr lang="en-US" sz="3200" dirty="0" smtClean="0">
                 <a:latin typeface="Comic Sans MS" pitchFamily="66" charset="0"/>
               </a:rPr>
-              <a:t>1)</a:t>
+              <a:t>Indicate the strongest asymptotic relation</a:t>
             </a:r>
           </a:p>
-        </p:txBody>
-      </p:sp>
-      <p:graphicFrame>
-        <p:nvGraphicFramePr>
-          <p:cNvPr id="3" name="Object 2"/>
-          <p:cNvGraphicFramePr>
-            <a:graphicFrameLocks noChangeAspect="1"/>
-          </p:cNvGraphicFramePr>
-          <p:nvPr>
-            <p:extLst>
-              <p:ext uri="{D42A27DB-BD31-4B8C-83A1-F6EECF244321}">
-                <p14:modId xmlns:p14="http://schemas.microsoft.com/office/powerpoint/2010/main" val="3043855849"/>
-              </p:ext>
-            </p:extLst>
-          </p:nvPr>
-        </p:nvGraphicFramePr>
-        <p:xfrm>
-          <a:off x="4514850" y="3346450"/>
-          <a:ext cx="114300" cy="165100"/>
-        </p:xfrm>
-        <a:graphic>
-          <a:graphicData uri="http://schemas.openxmlformats.org/presentationml/2006/ole">
-            <mc:AlternateContent xmlns:mc="http://schemas.openxmlformats.org/markup-compatibility/2006">
-              <mc:Choice xmlns:v="urn:schemas-microsoft-com:vml" Requires="v">
-                <p:oleObj spid="_x0000_s1027" name="Equation" r:id="rId6" imgW="114300" imgH="165100" progId="Equation.3">
-                  <p:embed/>
-                </p:oleObj>
-              </mc:Choice>
-              <mc:Fallback>
-                <p:oleObj name="Equation" r:id="rId6" imgW="114300" imgH="165100" progId="Equation.3">
-                  <p:embed/>
-                  <p:pic>
-                    <p:nvPicPr>
-                      <p:cNvPr id="0" name=""/>
-                      <p:cNvPicPr/>
-                      <p:nvPr/>
-                    </p:nvPicPr>
-                    <p:blipFill>
-                      <a:blip r:embed="rId7"/>
-                      <a:stretch>
-                        <a:fillRect/>
-                      </a:stretch>
-                    </p:blipFill>
-                    <p:spPr>
-                      <a:xfrm>
-                        <a:off x="4514850" y="3346450"/>
-                        <a:ext cx="114300" cy="165100"/>
-                      </a:xfrm>
-                      <a:prstGeom prst="rect">
-                        <a:avLst/>
-                      </a:prstGeom>
-                    </p:spPr>
-                  </p:pic>
-                </p:oleObj>
-              </mc:Fallback>
-            </mc:AlternateContent>
-          </a:graphicData>
-        </a:graphic>
-      </p:graphicFrame>
-      <p:graphicFrame>
-        <p:nvGraphicFramePr>
-          <p:cNvPr id="4" name="Object 3"/>
-          <p:cNvGraphicFramePr>
-            <a:graphicFrameLocks noChangeAspect="1"/>
-          </p:cNvGraphicFramePr>
-          <p:nvPr>
-            <p:extLst>
-              <p:ext uri="{D42A27DB-BD31-4B8C-83A1-F6EECF244321}">
-                <p14:modId xmlns:p14="http://schemas.microsoft.com/office/powerpoint/2010/main" val="3925614564"/>
-              </p:ext>
-            </p:extLst>
-          </p:nvPr>
-        </p:nvGraphicFramePr>
-        <p:xfrm>
-          <a:off x="1047260" y="3775642"/>
-          <a:ext cx="1992629" cy="1353484"/>
-        </p:xfrm>
-        <a:graphic>
-          <a:graphicData uri="http://schemas.openxmlformats.org/presentationml/2006/ole">
-            <mc:AlternateContent xmlns:mc="http://schemas.openxmlformats.org/markup-compatibility/2006">
-              <mc:Choice xmlns:v="urn:schemas-microsoft-com:vml" Requires="v">
-                <p:oleObj spid="_x0000_s1028" name="Equation" r:id="rId8" imgW="673100" imgH="457200" progId="Equation.3">
-                  <p:embed/>
-                </p:oleObj>
-              </mc:Choice>
-              <mc:Fallback>
-                <p:oleObj name="Equation" r:id="rId8" imgW="673100" imgH="457200" progId="Equation.3">
-                  <p:embed/>
-                  <p:pic>
-                    <p:nvPicPr>
-                      <p:cNvPr id="0" name=""/>
-                      <p:cNvPicPr/>
-                      <p:nvPr/>
-                    </p:nvPicPr>
-                    <p:blipFill>
-                      <a:blip r:embed="rId9"/>
-                      <a:stretch>
-                        <a:fillRect/>
-                      </a:stretch>
-                    </p:blipFill>
-                    <p:spPr>
-                      <a:xfrm>
-                        <a:off x="1047260" y="3775642"/>
-                        <a:ext cx="1992629" cy="1353484"/>
-                      </a:xfrm>
-                      <a:prstGeom prst="rect">
-                        <a:avLst/>
-                      </a:prstGeom>
-                    </p:spPr>
-                  </p:pic>
-                </p:oleObj>
-              </mc:Fallback>
-            </mc:AlternateContent>
-          </a:graphicData>
-        </a:graphic>
-      </p:graphicFrame>
-      <p:graphicFrame>
-        <p:nvGraphicFramePr>
-          <p:cNvPr id="17" name="Object 16"/>
-          <p:cNvGraphicFramePr>
-            <a:graphicFrameLocks noChangeAspect="1"/>
-          </p:cNvGraphicFramePr>
-          <p:nvPr>
-            <p:extLst>
-              <p:ext uri="{D42A27DB-BD31-4B8C-83A1-F6EECF244321}">
-                <p14:modId xmlns:p14="http://schemas.microsoft.com/office/powerpoint/2010/main" val="1487176545"/>
-              </p:ext>
-            </p:extLst>
-          </p:nvPr>
-        </p:nvGraphicFramePr>
-        <p:xfrm>
-          <a:off x="3836185" y="4046836"/>
-          <a:ext cx="2181367" cy="830997"/>
-        </p:xfrm>
-        <a:graphic>
-          <a:graphicData uri="http://schemas.openxmlformats.org/presentationml/2006/ole">
-            <mc:AlternateContent xmlns:mc="http://schemas.openxmlformats.org/markup-compatibility/2006">
-              <mc:Choice xmlns:v="urn:schemas-microsoft-com:vml" Requires="v">
-                <p:oleObj spid="_x0000_s1029" name="Equation" r:id="rId10" imgW="533400" imgH="203200" progId="Equation.3">
-                  <p:embed/>
-                </p:oleObj>
-              </mc:Choice>
-              <mc:Fallback>
-                <p:oleObj name="Equation" r:id="rId10" imgW="533400" imgH="203200" progId="Equation.3">
-                  <p:embed/>
-                  <p:pic>
-                    <p:nvPicPr>
-                      <p:cNvPr id="0" name=""/>
-                      <p:cNvPicPr/>
-                      <p:nvPr/>
-                    </p:nvPicPr>
-                    <p:blipFill>
-                      <a:blip r:embed="rId11"/>
-                      <a:stretch>
-                        <a:fillRect/>
-                      </a:stretch>
-                    </p:blipFill>
-                    <p:spPr>
-                      <a:xfrm>
-                        <a:off x="3836185" y="4046836"/>
-                        <a:ext cx="2181367" cy="830997"/>
-                      </a:xfrm>
-                      <a:prstGeom prst="rect">
-                        <a:avLst/>
-                      </a:prstGeom>
-                    </p:spPr>
-                  </p:pic>
-                </p:oleObj>
-              </mc:Fallback>
-            </mc:AlternateContent>
-          </a:graphicData>
-        </a:graphic>
-      </p:graphicFrame>
-      <p:sp>
-        <p:nvSpPr>
-          <p:cNvPr id="18" name="TextBox 17"/>
-          <p:cNvSpPr txBox="1"/>
-          <p:nvPr/>
-        </p:nvSpPr>
-        <p:spPr>
-          <a:xfrm>
-            <a:off x="211173" y="5266282"/>
-            <a:ext cx="785792" cy="830997"/>
-          </a:xfrm>
-          <a:prstGeom prst="rect">
-            <a:avLst/>
-          </a:prstGeom>
-          <a:noFill/>
-        </p:spPr>
-        <p:txBody>
-          <a:bodyPr wrap="none" rtlCol="0">
-            <a:spAutoFit/>
-          </a:bodyPr>
-          <a:lstStyle/>
           <a:p>
             <a:r>
-              <a:rPr lang="en-US" sz="4800" dirty="0">
+              <a:rPr lang="en-US" sz="3200" dirty="0" smtClean="0">
                 <a:latin typeface="Comic Sans MS" pitchFamily="66" charset="0"/>
               </a:rPr>
-              <a:t>2</a:t>
+              <a:t>that holds between the functions f and g:</a:t>
             </a:r>
-            <a:r>
-              <a:rPr lang="en-US" sz="4800" dirty="0" smtClean="0">
-                <a:latin typeface="Comic Sans MS" pitchFamily="66" charset="0"/>
-              </a:rPr>
-              <a:t>)</a:t>
-            </a:r>
-            <a:endParaRPr lang="en-US" sz="4800" dirty="0" smtClean="0">
+            <a:endParaRPr lang="en-US" sz="3200" dirty="0" smtClean="0">
               <a:latin typeface="Comic Sans MS" pitchFamily="66" charset="0"/>
             </a:endParaRPr>
           </a:p>
         </p:txBody>
       </p:sp>
-      <p:graphicFrame>
-        <p:nvGraphicFramePr>
-          <p:cNvPr id="20" name="Object 19"/>
-          <p:cNvGraphicFramePr>
-            <a:graphicFrameLocks noChangeAspect="1"/>
-          </p:cNvGraphicFramePr>
-          <p:nvPr>
-            <p:extLst>
-              <p:ext uri="{D42A27DB-BD31-4B8C-83A1-F6EECF244321}">
-                <p14:modId xmlns:p14="http://schemas.microsoft.com/office/powerpoint/2010/main" val="644029643"/>
-              </p:ext>
-            </p:extLst>
-          </p:nvPr>
-        </p:nvGraphicFramePr>
-        <p:xfrm>
-          <a:off x="1047260" y="5266282"/>
-          <a:ext cx="2181367" cy="830997"/>
-        </p:xfrm>
-        <a:graphic>
-          <a:graphicData uri="http://schemas.openxmlformats.org/presentationml/2006/ole">
-            <mc:AlternateContent xmlns:mc="http://schemas.openxmlformats.org/markup-compatibility/2006">
-              <mc:Choice xmlns:v="urn:schemas-microsoft-com:vml" Requires="v">
-                <p:oleObj spid="_x0000_s1030" name="Equation" r:id="rId12" imgW="533400" imgH="203200" progId="Equation.3">
-                  <p:embed/>
-                </p:oleObj>
-              </mc:Choice>
-              <mc:Fallback>
-                <p:oleObj name="Equation" r:id="rId12" imgW="533400" imgH="203200" progId="Equation.3">
-                  <p:embed/>
-                  <p:pic>
-                    <p:nvPicPr>
-                      <p:cNvPr id="0" name=""/>
-                      <p:cNvPicPr/>
-                      <p:nvPr/>
-                    </p:nvPicPr>
-                    <p:blipFill>
-                      <a:blip r:embed="rId11"/>
-                      <a:stretch>
-                        <a:fillRect/>
-                      </a:stretch>
-                    </p:blipFill>
-                    <p:spPr>
-                      <a:xfrm>
-                        <a:off x="1047260" y="5266282"/>
-                        <a:ext cx="2181367" cy="830997"/>
-                      </a:xfrm>
-                      <a:prstGeom prst="rect">
-                        <a:avLst/>
-                      </a:prstGeom>
-                    </p:spPr>
-                  </p:pic>
-                </p:oleObj>
-              </mc:Fallback>
-            </mc:AlternateContent>
-          </a:graphicData>
-        </a:graphic>
-      </p:graphicFrame>
-      <p:graphicFrame>
-        <p:nvGraphicFramePr>
-          <p:cNvPr id="5" name="Object 4"/>
-          <p:cNvGraphicFramePr>
-            <a:graphicFrameLocks noChangeAspect="1"/>
-          </p:cNvGraphicFramePr>
-          <p:nvPr>
-            <p:extLst>
-              <p:ext uri="{D42A27DB-BD31-4B8C-83A1-F6EECF244321}">
-                <p14:modId xmlns:p14="http://schemas.microsoft.com/office/powerpoint/2010/main" val="4156354292"/>
-              </p:ext>
-            </p:extLst>
-          </p:nvPr>
-        </p:nvGraphicFramePr>
-        <p:xfrm>
-          <a:off x="3836185" y="4995264"/>
-          <a:ext cx="2525134" cy="1472995"/>
-        </p:xfrm>
-        <a:graphic>
-          <a:graphicData uri="http://schemas.openxmlformats.org/presentationml/2006/ole">
-            <mc:AlternateContent xmlns:mc="http://schemas.openxmlformats.org/markup-compatibility/2006">
-              <mc:Choice xmlns:v="urn:schemas-microsoft-com:vml" Requires="v">
-                <p:oleObj spid="_x0000_s1031" name="Equation" r:id="rId13" imgW="762000" imgH="444500" progId="Equation.3">
-                  <p:embed/>
-                </p:oleObj>
-              </mc:Choice>
-              <mc:Fallback>
-                <p:oleObj name="Equation" r:id="rId13" imgW="762000" imgH="444500" progId="Equation.3">
-                  <p:embed/>
-                  <p:pic>
-                    <p:nvPicPr>
-                      <p:cNvPr id="0" name=""/>
-                      <p:cNvPicPr/>
-                      <p:nvPr/>
-                    </p:nvPicPr>
-                    <p:blipFill>
-                      <a:blip r:embed="rId14"/>
-                      <a:stretch>
-                        <a:fillRect/>
-                      </a:stretch>
-                    </p:blipFill>
-                    <p:spPr>
-                      <a:xfrm>
-                        <a:off x="3836185" y="4995264"/>
-                        <a:ext cx="2525134" cy="1472995"/>
-                      </a:xfrm>
-                      <a:prstGeom prst="rect">
-                        <a:avLst/>
-                      </a:prstGeom>
-                    </p:spPr>
-                  </p:pic>
-                </p:oleObj>
-              </mc:Fallback>
-            </mc:AlternateContent>
-          </a:graphicData>
-        </a:graphic>
-      </p:graphicFrame>
     </p:spTree>
     <p:extLst>
       <p:ext uri="{BB962C8B-B14F-4D97-AF65-F5344CB8AC3E}">

</xml_diff>